<commit_message>
Changed slides in presentation
</commit_message>
<xml_diff>
--- a/Presentation.pptx
+++ b/Presentation.pptx
@@ -6039,7 +6039,7 @@
         </p:spPr>
         <p:txBody>
           <a:bodyPr lIns="91440" tIns="91440" rIns="91440" bIns="91440" anchor="t">
-            <a:normAutofit lnSpcReduction="10000"/>
+            <a:normAutofit/>
           </a:bodyPr>
           <a:lstStyle/>
           <a:p>
@@ -6102,7 +6102,7 @@
               <a:rPr lang="en-US" sz="1400" dirty="0">
                 <a:latin typeface="Space Grotesk"/>
               </a:rPr>
-              <a:t> file, including table creation, data manipulation, queries, joins, a view, a stored procedure, a function, a trigger, and a transaction.</a:t>
+              <a:t> file, including table creation, data manipulation, queries, joins, a view, a function and trigger.</a:t>
             </a:r>
             <a:endParaRPr lang="en-US" sz="2800" b="0" u="none" strike="noStrike" dirty="0">
               <a:solidFill>
@@ -8705,8 +8705,8 @@
         </p:nvSpPr>
         <p:spPr>
           <a:xfrm>
-            <a:off x="286086" y="943470"/>
-            <a:ext cx="3407609" cy="3905256"/>
+            <a:off x="286086" y="1476322"/>
+            <a:ext cx="3407609" cy="3372404"/>
           </a:xfrm>
           <a:prstGeom prst="rect">
             <a:avLst/>
@@ -8787,50 +8787,6 @@
                 <a:latin typeface="Space Grotesk"/>
               </a:rPr>
               <a:t> are inserted, updated, or deleted.</a:t>
-            </a:r>
-          </a:p>
-          <a:p>
-            <a:r>
-              <a:rPr lang="en-US" sz="1400" b="1" dirty="0">
-                <a:latin typeface="Space Grotesk"/>
-              </a:rPr>
-              <a:t>Stored Procedure:</a:t>
-            </a:r>
-          </a:p>
-          <a:p>
-            <a:r>
-              <a:rPr lang="en-US" sz="1400" b="1" dirty="0">
-                <a:latin typeface="Space Grotesk"/>
-              </a:rPr>
-              <a:t>  </a:t>
-            </a:r>
-            <a:r>
-              <a:rPr lang="en-US" sz="1400" b="1" dirty="0" err="1">
-                <a:latin typeface="Space Grotesk"/>
-              </a:rPr>
-              <a:t>GetOrdersPaged</a:t>
-            </a:r>
-            <a:r>
-              <a:rPr lang="en-US" sz="1400" dirty="0">
-                <a:latin typeface="Space Grotesk"/>
-              </a:rPr>
-              <a:t>: Retrieves a paginated list of orders for a specific customer, allowing for efficient retrieval of large datasets.</a:t>
-            </a:r>
-          </a:p>
-          <a:p>
-            <a:r>
-              <a:rPr lang="en-US" sz="1400" b="1" dirty="0">
-                <a:latin typeface="Space Grotesk"/>
-              </a:rPr>
-              <a:t>Manual Transaction:</a:t>
-            </a:r>
-          </a:p>
-          <a:p>
-            <a:r>
-              <a:rPr lang="en-US" sz="1400" dirty="0">
-                <a:latin typeface="Space Grotesk"/>
-              </a:rPr>
-              <a:t>  Used BEGIN TRANSACTION, COMMIT, and ROLLBACK to ensure atomicity of database operations such as creating an order and adding order items.</a:t>
             </a:r>
           </a:p>
         </p:txBody>
@@ -8857,7 +8813,7 @@
         </p:blipFill>
         <p:spPr>
           <a:xfrm>
-            <a:off x="4042954" y="773845"/>
+            <a:off x="4046048" y="1707839"/>
             <a:ext cx="3407609" cy="590735"/>
           </a:xfrm>
           <a:prstGeom prst="rect">
@@ -8887,68 +8843,8 @@
         </p:blipFill>
         <p:spPr>
           <a:xfrm>
-            <a:off x="5123916" y="1476322"/>
+            <a:off x="5127010" y="2410316"/>
             <a:ext cx="3733998" cy="832382"/>
-          </a:xfrm>
-          <a:prstGeom prst="rect">
-            <a:avLst/>
-          </a:prstGeom>
-        </p:spPr>
-      </p:pic>
-      <p:pic>
-        <p:nvPicPr>
-          <p:cNvPr id="7" name="Picture 6">
-            <a:extLst>
-              <a:ext uri="{FF2B5EF4-FFF2-40B4-BE49-F238E27FC236}">
-                <a16:creationId xmlns:a16="http://schemas.microsoft.com/office/drawing/2014/main" id="{8F28ADCB-9FD3-68E8-96FD-3C8AA80BB1AF}"/>
-              </a:ext>
-            </a:extLst>
-          </p:cNvPr>
-          <p:cNvPicPr>
-            <a:picLocks noChangeAspect="1"/>
-          </p:cNvPicPr>
-          <p:nvPr/>
-        </p:nvPicPr>
-        <p:blipFill>
-          <a:blip r:embed="rId4"/>
-          <a:stretch>
-            <a:fillRect/>
-          </a:stretch>
-        </p:blipFill>
-        <p:spPr>
-          <a:xfrm>
-            <a:off x="4392321" y="2388230"/>
-            <a:ext cx="2653731" cy="1110297"/>
-          </a:xfrm>
-          <a:prstGeom prst="rect">
-            <a:avLst/>
-          </a:prstGeom>
-        </p:spPr>
-      </p:pic>
-      <p:pic>
-        <p:nvPicPr>
-          <p:cNvPr id="9" name="Picture 8">
-            <a:extLst>
-              <a:ext uri="{FF2B5EF4-FFF2-40B4-BE49-F238E27FC236}">
-                <a16:creationId xmlns:a16="http://schemas.microsoft.com/office/drawing/2014/main" id="{B34696A2-61CA-8005-9BA1-58A649A7343D}"/>
-              </a:ext>
-            </a:extLst>
-          </p:cNvPr>
-          <p:cNvPicPr>
-            <a:picLocks noChangeAspect="1"/>
-          </p:cNvPicPr>
-          <p:nvPr/>
-        </p:nvPicPr>
-        <p:blipFill>
-          <a:blip r:embed="rId5"/>
-          <a:stretch>
-            <a:fillRect/>
-          </a:stretch>
-        </p:blipFill>
-        <p:spPr>
-          <a:xfrm>
-            <a:off x="5837159" y="3578053"/>
-            <a:ext cx="2417787" cy="1433195"/>
           </a:xfrm>
           <a:prstGeom prst="rect">
             <a:avLst/>

</xml_diff>